<commit_message>
Bluetooth, LCD, and touch panel were initialized.
</commit_message>
<xml_diff>
--- a/Documents/Presentation.pptx
+++ b/Documents/Presentation.pptx
@@ -22,6 +22,11 @@
     <p:sldId id="270" r:id="rId16"/>
     <p:sldId id="271" r:id="rId17"/>
     <p:sldId id="272" r:id="rId18"/>
+    <p:sldId id="276" r:id="rId19"/>
+    <p:sldId id="273" r:id="rId20"/>
+    <p:sldId id="274" r:id="rId21"/>
+    <p:sldId id="275" r:id="rId22"/>
+    <p:sldId id="277" r:id="rId23"/>
   </p:sldIdLst>
   <p:sldSz cx="9144000" cy="6858000" type="screen4x3"/>
   <p:notesSz cx="6858000" cy="9144000"/>
@@ -305,7 +310,7 @@
             <a:fld id="{1D8BD707-D9CF-40AE-B4C6-C98DA3205C09}" type="datetimeFigureOut">
               <a:rPr lang="en-US" smtClean="0"/>
               <a:pPr/>
-              <a:t>9/3/2025</a:t>
+              <a:t>9/10/2025</a:t>
             </a:fld>
             <a:endParaRPr lang="en-US"/>
           </a:p>
@@ -472,7 +477,7 @@
             <a:fld id="{1D8BD707-D9CF-40AE-B4C6-C98DA3205C09}" type="datetimeFigureOut">
               <a:rPr lang="en-US" smtClean="0"/>
               <a:pPr/>
-              <a:t>9/3/2025</a:t>
+              <a:t>9/10/2025</a:t>
             </a:fld>
             <a:endParaRPr lang="en-US"/>
           </a:p>
@@ -649,7 +654,7 @@
             <a:fld id="{1D8BD707-D9CF-40AE-B4C6-C98DA3205C09}" type="datetimeFigureOut">
               <a:rPr lang="en-US" smtClean="0"/>
               <a:pPr/>
-              <a:t>9/3/2025</a:t>
+              <a:t>9/10/2025</a:t>
             </a:fld>
             <a:endParaRPr lang="en-US"/>
           </a:p>
@@ -816,7 +821,7 @@
             <a:fld id="{1D8BD707-D9CF-40AE-B4C6-C98DA3205C09}" type="datetimeFigureOut">
               <a:rPr lang="en-US" smtClean="0"/>
               <a:pPr/>
-              <a:t>9/3/2025</a:t>
+              <a:t>9/10/2025</a:t>
             </a:fld>
             <a:endParaRPr lang="en-US"/>
           </a:p>
@@ -1059,7 +1064,7 @@
             <a:fld id="{1D8BD707-D9CF-40AE-B4C6-C98DA3205C09}" type="datetimeFigureOut">
               <a:rPr lang="en-US" smtClean="0"/>
               <a:pPr/>
-              <a:t>9/3/2025</a:t>
+              <a:t>9/10/2025</a:t>
             </a:fld>
             <a:endParaRPr lang="en-US"/>
           </a:p>
@@ -1344,7 +1349,7 @@
             <a:fld id="{1D8BD707-D9CF-40AE-B4C6-C98DA3205C09}" type="datetimeFigureOut">
               <a:rPr lang="en-US" smtClean="0"/>
               <a:pPr/>
-              <a:t>9/3/2025</a:t>
+              <a:t>9/10/2025</a:t>
             </a:fld>
             <a:endParaRPr lang="en-US"/>
           </a:p>
@@ -1763,7 +1768,7 @@
             <a:fld id="{1D8BD707-D9CF-40AE-B4C6-C98DA3205C09}" type="datetimeFigureOut">
               <a:rPr lang="en-US" smtClean="0"/>
               <a:pPr/>
-              <a:t>9/3/2025</a:t>
+              <a:t>9/10/2025</a:t>
             </a:fld>
             <a:endParaRPr lang="en-US"/>
           </a:p>
@@ -1878,7 +1883,7 @@
             <a:fld id="{1D8BD707-D9CF-40AE-B4C6-C98DA3205C09}" type="datetimeFigureOut">
               <a:rPr lang="en-US" smtClean="0"/>
               <a:pPr/>
-              <a:t>9/3/2025</a:t>
+              <a:t>9/10/2025</a:t>
             </a:fld>
             <a:endParaRPr lang="en-US"/>
           </a:p>
@@ -1970,7 +1975,7 @@
             <a:fld id="{1D8BD707-D9CF-40AE-B4C6-C98DA3205C09}" type="datetimeFigureOut">
               <a:rPr lang="en-US" smtClean="0"/>
               <a:pPr/>
-              <a:t>9/3/2025</a:t>
+              <a:t>9/10/2025</a:t>
             </a:fld>
             <a:endParaRPr lang="en-US"/>
           </a:p>
@@ -2244,7 +2249,7 @@
             <a:fld id="{1D8BD707-D9CF-40AE-B4C6-C98DA3205C09}" type="datetimeFigureOut">
               <a:rPr lang="en-US" smtClean="0"/>
               <a:pPr/>
-              <a:t>9/3/2025</a:t>
+              <a:t>9/10/2025</a:t>
             </a:fld>
             <a:endParaRPr lang="en-US"/>
           </a:p>
@@ -2494,7 +2499,7 @@
             <a:fld id="{1D8BD707-D9CF-40AE-B4C6-C98DA3205C09}" type="datetimeFigureOut">
               <a:rPr lang="en-US" smtClean="0"/>
               <a:pPr/>
-              <a:t>9/3/2025</a:t>
+              <a:t>9/10/2025</a:t>
             </a:fld>
             <a:endParaRPr lang="en-US"/>
           </a:p>
@@ -2704,7 +2709,7 @@
             <a:fld id="{1D8BD707-D9CF-40AE-B4C6-C98DA3205C09}" type="datetimeFigureOut">
               <a:rPr lang="en-US" smtClean="0"/>
               <a:pPr/>
-              <a:t>9/3/2025</a:t>
+              <a:t>9/10/2025</a:t>
             </a:fld>
             <a:endParaRPr lang="en-US"/>
           </a:p>
@@ -3243,7 +3248,6 @@
               <a:rPr lang="en-US" dirty="0"/>
               <a:t>Bring up</a:t>
             </a:r>
-            <a:endParaRPr lang="en-US" dirty="0"/>
           </a:p>
         </p:txBody>
       </p:sp>
@@ -3361,7 +3365,6 @@
               <a:rPr lang="en-US" dirty="0"/>
               <a:t>Programming UI</a:t>
             </a:r>
-            <a:endParaRPr lang="en-US" dirty="0"/>
           </a:p>
         </p:txBody>
       </p:sp>
@@ -3487,7 +3490,6 @@
               <a:rPr lang="en-US" dirty="0"/>
               <a:t>Stride, pace, and ground contact</a:t>
             </a:r>
-            <a:endParaRPr lang="en-US" dirty="0"/>
           </a:p>
         </p:txBody>
       </p:sp>
@@ -3619,7 +3621,6 @@
               <a:rPr lang="en-US" dirty="0"/>
               <a:t> challenges and community</a:t>
             </a:r>
-            <a:endParaRPr lang="en-US" dirty="0"/>
           </a:p>
         </p:txBody>
       </p:sp>
@@ -3719,7 +3720,6 @@
               <a:rPr lang="en-US" dirty="0"/>
               <a:t>OTA</a:t>
             </a:r>
-            <a:endParaRPr lang="en-US" dirty="0"/>
           </a:p>
         </p:txBody>
       </p:sp>
@@ -3833,7 +3833,6 @@
               <a:rPr lang="en-US" dirty="0"/>
               <a:t>User feedback</a:t>
             </a:r>
-            <a:endParaRPr lang="en-US" dirty="0"/>
           </a:p>
         </p:txBody>
       </p:sp>
@@ -3925,7 +3924,6 @@
               <a:rPr lang="en-US" dirty="0"/>
               <a:t>Wireless connectivity</a:t>
             </a:r>
-            <a:endParaRPr lang="en-US" dirty="0"/>
           </a:p>
         </p:txBody>
       </p:sp>
@@ -3986,6 +3984,315 @@
     <p:extLst>
       <p:ext uri="{BB962C8B-B14F-4D97-AF65-F5344CB8AC3E}">
         <p14:creationId xmlns:p14="http://schemas.microsoft.com/office/powerpoint/2010/main" val="341737120"/>
+      </p:ext>
+    </p:extLst>
+  </p:cSld>
+  <p:clrMapOvr>
+    <a:masterClrMapping/>
+  </p:clrMapOvr>
+</p:sld>
+</file>
+
+<file path=ppt/slides/slide18.xml><?xml version="1.0" encoding="utf-8"?>
+<p:sld xmlns:a="http://schemas.openxmlformats.org/drawingml/2006/main" xmlns:r="http://schemas.openxmlformats.org/officeDocument/2006/relationships" xmlns:p="http://schemas.openxmlformats.org/presentationml/2006/main">
+  <p:cSld>
+    <p:spTree>
+      <p:nvGrpSpPr>
+        <p:cNvPr id="1" name=""/>
+        <p:cNvGrpSpPr/>
+        <p:nvPr/>
+      </p:nvGrpSpPr>
+      <p:grpSpPr>
+        <a:xfrm>
+          <a:off x="0" y="0"/>
+          <a:ext cx="0" cy="0"/>
+          <a:chOff x="0" y="0"/>
+          <a:chExt cx="0" cy="0"/>
+        </a:xfrm>
+      </p:grpSpPr>
+      <p:sp>
+        <p:nvSpPr>
+          <p:cNvPr id="2" name="Title 1"/>
+          <p:cNvSpPr>
+            <a:spLocks noGrp="1"/>
+          </p:cNvSpPr>
+          <p:nvPr>
+            <p:ph type="title"/>
+          </p:nvPr>
+        </p:nvSpPr>
+        <p:spPr>
+          <a:xfrm>
+            <a:off x="457200" y="2895600"/>
+            <a:ext cx="8229600" cy="1143000"/>
+          </a:xfrm>
+        </p:spPr>
+        <p:txBody>
+          <a:bodyPr/>
+          <a:lstStyle/>
+          <a:p>
+            <a:r>
+              <a:rPr lang="en-US" dirty="0" smtClean="0"/>
+              <a:t>Engineering Prototype</a:t>
+            </a:r>
+            <a:endParaRPr lang="en-US" dirty="0"/>
+          </a:p>
+        </p:txBody>
+      </p:sp>
+    </p:spTree>
+    <p:extLst>
+      <p:ext uri="{BB962C8B-B14F-4D97-AF65-F5344CB8AC3E}">
+        <p14:creationId xmlns:p14="http://schemas.microsoft.com/office/powerpoint/2010/main" val="1838943462"/>
+      </p:ext>
+    </p:extLst>
+  </p:cSld>
+  <p:clrMapOvr>
+    <a:masterClrMapping/>
+  </p:clrMapOvr>
+</p:sld>
+</file>
+
+<file path=ppt/slides/slide19.xml><?xml version="1.0" encoding="utf-8"?>
+<p:sld xmlns:a="http://schemas.openxmlformats.org/drawingml/2006/main" xmlns:r="http://schemas.openxmlformats.org/officeDocument/2006/relationships" xmlns:p="http://schemas.openxmlformats.org/presentationml/2006/main">
+  <p:cSld>
+    <p:spTree>
+      <p:nvGrpSpPr>
+        <p:cNvPr id="1" name=""/>
+        <p:cNvGrpSpPr/>
+        <p:nvPr/>
+      </p:nvGrpSpPr>
+      <p:grpSpPr>
+        <a:xfrm>
+          <a:off x="0" y="0"/>
+          <a:ext cx="0" cy="0"/>
+          <a:chOff x="0" y="0"/>
+          <a:chExt cx="0" cy="0"/>
+        </a:xfrm>
+      </p:grpSpPr>
+      <p:sp>
+        <p:nvSpPr>
+          <p:cNvPr id="2" name="Title 1"/>
+          <p:cNvSpPr>
+            <a:spLocks noGrp="1"/>
+          </p:cNvSpPr>
+          <p:nvPr>
+            <p:ph type="title"/>
+          </p:nvPr>
+        </p:nvSpPr>
+        <p:spPr/>
+        <p:txBody>
+          <a:bodyPr/>
+          <a:lstStyle/>
+          <a:p>
+            <a:r>
+              <a:rPr lang="en-US" dirty="0" smtClean="0"/>
+              <a:t>Assembling of hardware</a:t>
+            </a:r>
+            <a:br>
+              <a:rPr lang="en-US" dirty="0" smtClean="0"/>
+            </a:br>
+            <a:endParaRPr lang="en-US" dirty="0"/>
+          </a:p>
+        </p:txBody>
+      </p:sp>
+      <p:sp>
+        <p:nvSpPr>
+          <p:cNvPr id="4" name="Text Placeholder 3"/>
+          <p:cNvSpPr>
+            <a:spLocks noGrp="1"/>
+          </p:cNvSpPr>
+          <p:nvPr>
+            <p:ph type="body" sz="half" idx="2"/>
+          </p:nvPr>
+        </p:nvSpPr>
+        <p:spPr>
+          <a:xfrm>
+            <a:off x="457200" y="1435100"/>
+            <a:ext cx="3657600" cy="4691063"/>
+          </a:xfrm>
+        </p:spPr>
+        <p:txBody>
+          <a:bodyPr>
+            <a:normAutofit/>
+          </a:bodyPr>
+          <a:lstStyle/>
+          <a:p>
+            <a:pPr marL="342900" indent="-342900">
+              <a:buAutoNum type="arabicPeriod"/>
+            </a:pPr>
+            <a:r>
+              <a:rPr lang="en-US" sz="1800" dirty="0" smtClean="0"/>
+              <a:t>ESP32-S3R8 Chip</a:t>
+            </a:r>
+          </a:p>
+          <a:p>
+            <a:pPr marL="342900" indent="-342900">
+              <a:buAutoNum type="arabicPeriod"/>
+            </a:pPr>
+            <a:r>
+              <a:rPr lang="en-US" sz="1800" dirty="0" smtClean="0"/>
+              <a:t>W25Q128JVSIQ 16M NOR-Flash</a:t>
+            </a:r>
+          </a:p>
+          <a:p>
+            <a:pPr marL="342900" indent="-342900">
+              <a:buAutoNum type="arabicPeriod"/>
+            </a:pPr>
+            <a:r>
+              <a:rPr lang="en-US" sz="1800" dirty="0" smtClean="0"/>
+              <a:t>PCF85063 RTC Clock</a:t>
+            </a:r>
+          </a:p>
+          <a:p>
+            <a:pPr marL="342900" indent="-342900">
+              <a:buAutoNum type="arabicPeriod"/>
+            </a:pPr>
+            <a:r>
+              <a:rPr lang="en-US" sz="1800" dirty="0" smtClean="0"/>
+              <a:t>QMI8658 IMU</a:t>
+            </a:r>
+          </a:p>
+          <a:p>
+            <a:pPr marL="342900" indent="-342900">
+              <a:buAutoNum type="arabicPeriod"/>
+            </a:pPr>
+            <a:r>
+              <a:rPr lang="en-US" sz="1800" dirty="0" smtClean="0"/>
+              <a:t>ETA6098 Charging Chip</a:t>
+            </a:r>
+          </a:p>
+          <a:p>
+            <a:pPr marL="342900" indent="-342900">
+              <a:buAutoNum type="arabicPeriod"/>
+            </a:pPr>
+            <a:r>
+              <a:rPr lang="en-US" sz="1800" dirty="0" smtClean="0"/>
+              <a:t>MX1.25 Battery Interface</a:t>
+            </a:r>
+          </a:p>
+          <a:p>
+            <a:pPr marL="342900" indent="-342900">
+              <a:buAutoNum type="arabicPeriod"/>
+            </a:pPr>
+            <a:r>
+              <a:rPr lang="en-US" sz="1800" dirty="0" smtClean="0"/>
+              <a:t>Type-C ESP-S3 USB</a:t>
+            </a:r>
+          </a:p>
+          <a:p>
+            <a:pPr marL="342900" indent="-342900">
+              <a:buAutoNum type="arabicPeriod"/>
+            </a:pPr>
+            <a:r>
+              <a:rPr lang="en-US" sz="1800" dirty="0" smtClean="0"/>
+              <a:t>Buzzer</a:t>
+            </a:r>
+          </a:p>
+          <a:p>
+            <a:pPr marL="342900" indent="-342900">
+              <a:buAutoNum type="arabicPeriod"/>
+            </a:pPr>
+            <a:r>
+              <a:rPr lang="en-US" sz="1800" dirty="0" smtClean="0"/>
+              <a:t>RTC Battery Interface</a:t>
+            </a:r>
+          </a:p>
+          <a:p>
+            <a:pPr marL="342900" indent="-342900">
+              <a:buAutoNum type="arabicPeriod"/>
+            </a:pPr>
+            <a:r>
+              <a:rPr lang="en-US" sz="1800" dirty="0" smtClean="0"/>
+              <a:t>2.4 GHz </a:t>
+            </a:r>
+            <a:r>
+              <a:rPr lang="en-US" sz="1800" dirty="0" err="1" smtClean="0"/>
+              <a:t>WiFi</a:t>
+            </a:r>
+            <a:r>
+              <a:rPr lang="en-US" sz="1800" dirty="0" smtClean="0"/>
+              <a:t> and Bluetooth 5</a:t>
+            </a:r>
+          </a:p>
+          <a:p>
+            <a:pPr marL="342900" indent="-342900">
+              <a:buAutoNum type="arabicPeriod"/>
+            </a:pPr>
+            <a:r>
+              <a:rPr lang="en-US" sz="1800" dirty="0" smtClean="0"/>
+              <a:t>Power Button</a:t>
+            </a:r>
+          </a:p>
+          <a:p>
+            <a:pPr marL="342900" indent="-342900">
+              <a:buAutoNum type="arabicPeriod"/>
+            </a:pPr>
+            <a:r>
+              <a:rPr lang="en-US" sz="1800" dirty="0" smtClean="0"/>
+              <a:t>Boot Key</a:t>
+            </a:r>
+          </a:p>
+          <a:p>
+            <a:pPr marL="342900" indent="-342900">
+              <a:buAutoNum type="arabicPeriod"/>
+            </a:pPr>
+            <a:r>
+              <a:rPr lang="en-US" sz="1800" dirty="0" smtClean="0"/>
+              <a:t>Reset Key</a:t>
+            </a:r>
+          </a:p>
+          <a:p>
+            <a:pPr marL="342900" indent="-342900">
+              <a:buAutoNum type="arabicPeriod"/>
+            </a:pPr>
+            <a:endParaRPr lang="en-US" dirty="0"/>
+          </a:p>
+        </p:txBody>
+      </p:sp>
+      <p:pic>
+        <p:nvPicPr>
+          <p:cNvPr id="1026" name="Picture 2" descr="C:\Users\HP\Pictures\Media.jpg"/>
+          <p:cNvPicPr>
+            <a:picLocks noChangeAspect="1" noChangeArrowheads="1"/>
+          </p:cNvPicPr>
+          <p:nvPr/>
+        </p:nvPicPr>
+        <p:blipFill>
+          <a:blip r:embed="rId2">
+            <a:extLst>
+              <a:ext uri="{28A0092B-C50C-407E-A947-70E740481C1C}">
+                <a14:useLocalDpi xmlns:a14="http://schemas.microsoft.com/office/drawing/2010/main" val="0"/>
+              </a:ext>
+            </a:extLst>
+          </a:blip>
+          <a:srcRect/>
+          <a:stretch>
+            <a:fillRect/>
+          </a:stretch>
+        </p:blipFill>
+        <p:spPr bwMode="auto">
+          <a:xfrm>
+            <a:off x="3733800" y="1447800"/>
+            <a:ext cx="5096177" cy="4267200"/>
+          </a:xfrm>
+          <a:prstGeom prst="rect">
+            <a:avLst/>
+          </a:prstGeom>
+          <a:noFill/>
+          <a:extLst>
+            <a:ext uri="{909E8E84-426E-40DD-AFC4-6F175D3DCCD1}">
+              <a14:hiddenFill xmlns:a14="http://schemas.microsoft.com/office/drawing/2010/main">
+                <a:solidFill>
+                  <a:srgbClr val="FFFFFF"/>
+                </a:solidFill>
+              </a14:hiddenFill>
+            </a:ext>
+          </a:extLst>
+        </p:spPr>
+      </p:pic>
+    </p:spTree>
+    <p:extLst>
+      <p:ext uri="{BB962C8B-B14F-4D97-AF65-F5344CB8AC3E}">
+        <p14:creationId xmlns:p14="http://schemas.microsoft.com/office/powerpoint/2010/main" val="2016661355"/>
       </p:ext>
     </p:extLst>
   </p:cSld>
@@ -4096,6 +4403,359 @@
 </p:sld>
 </file>
 
+<file path=ppt/slides/slide20.xml><?xml version="1.0" encoding="utf-8"?>
+<p:sld xmlns:a="http://schemas.openxmlformats.org/drawingml/2006/main" xmlns:r="http://schemas.openxmlformats.org/officeDocument/2006/relationships" xmlns:p="http://schemas.openxmlformats.org/presentationml/2006/main">
+  <p:cSld>
+    <p:spTree>
+      <p:nvGrpSpPr>
+        <p:cNvPr id="1" name=""/>
+        <p:cNvGrpSpPr/>
+        <p:nvPr/>
+      </p:nvGrpSpPr>
+      <p:grpSpPr>
+        <a:xfrm>
+          <a:off x="0" y="0"/>
+          <a:ext cx="0" cy="0"/>
+          <a:chOff x="0" y="0"/>
+          <a:chExt cx="0" cy="0"/>
+        </a:xfrm>
+      </p:grpSpPr>
+      <p:sp>
+        <p:nvSpPr>
+          <p:cNvPr id="2" name="Title 1"/>
+          <p:cNvSpPr>
+            <a:spLocks noGrp="1"/>
+          </p:cNvSpPr>
+          <p:nvPr>
+            <p:ph type="title"/>
+          </p:nvPr>
+        </p:nvSpPr>
+        <p:spPr/>
+        <p:txBody>
+          <a:bodyPr/>
+          <a:lstStyle/>
+          <a:p>
+            <a:r>
+              <a:rPr lang="en-US" dirty="0" smtClean="0"/>
+              <a:t>EEZ Studio</a:t>
+            </a:r>
+            <a:endParaRPr lang="en-US" dirty="0"/>
+          </a:p>
+        </p:txBody>
+      </p:sp>
+      <p:sp>
+        <p:nvSpPr>
+          <p:cNvPr id="3" name="Content Placeholder 2"/>
+          <p:cNvSpPr>
+            <a:spLocks noGrp="1"/>
+          </p:cNvSpPr>
+          <p:nvPr>
+            <p:ph idx="1"/>
+          </p:nvPr>
+        </p:nvSpPr>
+        <p:spPr/>
+        <p:txBody>
+          <a:bodyPr/>
+          <a:lstStyle/>
+          <a:p>
+            <a:endParaRPr lang="en-US"/>
+          </a:p>
+        </p:txBody>
+      </p:sp>
+      <p:pic>
+        <p:nvPicPr>
+          <p:cNvPr id="2050" name="Picture 2"/>
+          <p:cNvPicPr>
+            <a:picLocks noChangeAspect="1" noChangeArrowheads="1"/>
+          </p:cNvPicPr>
+          <p:nvPr/>
+        </p:nvPicPr>
+        <p:blipFill>
+          <a:blip r:embed="rId2" cstate="print">
+            <a:extLst>
+              <a:ext uri="{28A0092B-C50C-407E-A947-70E740481C1C}">
+                <a14:useLocalDpi xmlns:a14="http://schemas.microsoft.com/office/drawing/2010/main" val="0"/>
+              </a:ext>
+            </a:extLst>
+          </a:blip>
+          <a:srcRect/>
+          <a:stretch>
+            <a:fillRect/>
+          </a:stretch>
+        </p:blipFill>
+        <p:spPr bwMode="auto">
+          <a:xfrm>
+            <a:off x="436632" y="1600200"/>
+            <a:ext cx="8242765" cy="4495800"/>
+          </a:xfrm>
+          <a:prstGeom prst="rect">
+            <a:avLst/>
+          </a:prstGeom>
+          <a:noFill/>
+          <a:ln>
+            <a:noFill/>
+          </a:ln>
+          <a:effectLst/>
+          <a:extLst>
+            <a:ext uri="{909E8E84-426E-40DD-AFC4-6F175D3DCCD1}">
+              <a14:hiddenFill xmlns:a14="http://schemas.microsoft.com/office/drawing/2010/main">
+                <a:solidFill>
+                  <a:schemeClr val="accent1"/>
+                </a:solidFill>
+              </a14:hiddenFill>
+            </a:ext>
+            <a:ext uri="{91240B29-F687-4F45-9708-019B960494DF}">
+              <a14:hiddenLine xmlns:a14="http://schemas.microsoft.com/office/drawing/2010/main" w="9525">
+                <a:solidFill>
+                  <a:schemeClr val="tx1"/>
+                </a:solidFill>
+                <a:miter lim="800000"/>
+                <a:headEnd/>
+                <a:tailEnd/>
+              </a14:hiddenLine>
+            </a:ext>
+            <a:ext uri="{AF507438-7753-43E0-B8FC-AC1667EBCBE1}">
+              <a14:hiddenEffects xmlns:a14="http://schemas.microsoft.com/office/drawing/2010/main">
+                <a:effectLst>
+                  <a:outerShdw dist="35921" dir="2700000" algn="ctr" rotWithShape="0">
+                    <a:schemeClr val="bg2"/>
+                  </a:outerShdw>
+                </a:effectLst>
+              </a14:hiddenEffects>
+            </a:ext>
+          </a:extLst>
+        </p:spPr>
+      </p:pic>
+    </p:spTree>
+    <p:extLst>
+      <p:ext uri="{BB962C8B-B14F-4D97-AF65-F5344CB8AC3E}">
+        <p14:creationId xmlns:p14="http://schemas.microsoft.com/office/powerpoint/2010/main" val="932310274"/>
+      </p:ext>
+    </p:extLst>
+  </p:cSld>
+  <p:clrMapOvr>
+    <a:masterClrMapping/>
+  </p:clrMapOvr>
+</p:sld>
+</file>
+
+<file path=ppt/slides/slide21.xml><?xml version="1.0" encoding="utf-8"?>
+<p:sld xmlns:a="http://schemas.openxmlformats.org/drawingml/2006/main" xmlns:r="http://schemas.openxmlformats.org/officeDocument/2006/relationships" xmlns:p="http://schemas.openxmlformats.org/presentationml/2006/main">
+  <p:cSld>
+    <p:spTree>
+      <p:nvGrpSpPr>
+        <p:cNvPr id="1" name=""/>
+        <p:cNvGrpSpPr/>
+        <p:nvPr/>
+      </p:nvGrpSpPr>
+      <p:grpSpPr>
+        <a:xfrm>
+          <a:off x="0" y="0"/>
+          <a:ext cx="0" cy="0"/>
+          <a:chOff x="0" y="0"/>
+          <a:chExt cx="0" cy="0"/>
+        </a:xfrm>
+      </p:grpSpPr>
+      <p:sp>
+        <p:nvSpPr>
+          <p:cNvPr id="2" name="Title 1"/>
+          <p:cNvSpPr>
+            <a:spLocks noGrp="1"/>
+          </p:cNvSpPr>
+          <p:nvPr>
+            <p:ph type="title"/>
+          </p:nvPr>
+        </p:nvSpPr>
+        <p:spPr/>
+        <p:txBody>
+          <a:bodyPr/>
+          <a:lstStyle/>
+          <a:p>
+            <a:r>
+              <a:rPr lang="en-US" dirty="0" err="1" smtClean="0"/>
+              <a:t>ESPRessif</a:t>
+            </a:r>
+            <a:r>
+              <a:rPr lang="en-US" dirty="0" smtClean="0"/>
+              <a:t>-IDE</a:t>
+            </a:r>
+            <a:endParaRPr lang="en-US" dirty="0"/>
+          </a:p>
+        </p:txBody>
+      </p:sp>
+      <p:pic>
+        <p:nvPicPr>
+          <p:cNvPr id="3074" name="Picture 2"/>
+          <p:cNvPicPr>
+            <a:picLocks noGrp="1" noChangeAspect="1" noChangeArrowheads="1"/>
+          </p:cNvPicPr>
+          <p:nvPr>
+            <p:ph idx="1"/>
+          </p:nvPr>
+        </p:nvPicPr>
+        <p:blipFill>
+          <a:blip r:embed="rId2" cstate="print">
+            <a:extLst>
+              <a:ext uri="{28A0092B-C50C-407E-A947-70E740481C1C}">
+                <a14:useLocalDpi xmlns:a14="http://schemas.microsoft.com/office/drawing/2010/main" val="0"/>
+              </a:ext>
+            </a:extLst>
+          </a:blip>
+          <a:srcRect/>
+          <a:stretch>
+            <a:fillRect/>
+          </a:stretch>
+        </p:blipFill>
+        <p:spPr bwMode="auto">
+          <a:xfrm>
+            <a:off x="457200" y="1662728"/>
+            <a:ext cx="8229600" cy="4400907"/>
+          </a:xfrm>
+          <a:prstGeom prst="rect">
+            <a:avLst/>
+          </a:prstGeom>
+          <a:noFill/>
+          <a:ln>
+            <a:noFill/>
+          </a:ln>
+          <a:effectLst/>
+          <a:extLst>
+            <a:ext uri="{909E8E84-426E-40DD-AFC4-6F175D3DCCD1}">
+              <a14:hiddenFill xmlns:a14="http://schemas.microsoft.com/office/drawing/2010/main">
+                <a:solidFill>
+                  <a:schemeClr val="accent1"/>
+                </a:solidFill>
+              </a14:hiddenFill>
+            </a:ext>
+            <a:ext uri="{91240B29-F687-4F45-9708-019B960494DF}">
+              <a14:hiddenLine xmlns:a14="http://schemas.microsoft.com/office/drawing/2010/main" w="9525">
+                <a:solidFill>
+                  <a:schemeClr val="tx1"/>
+                </a:solidFill>
+                <a:miter lim="800000"/>
+                <a:headEnd/>
+                <a:tailEnd/>
+              </a14:hiddenLine>
+            </a:ext>
+            <a:ext uri="{AF507438-7753-43E0-B8FC-AC1667EBCBE1}">
+              <a14:hiddenEffects xmlns:a14="http://schemas.microsoft.com/office/drawing/2010/main">
+                <a:effectLst>
+                  <a:outerShdw dist="35921" dir="2700000" algn="ctr" rotWithShape="0">
+                    <a:schemeClr val="bg2"/>
+                  </a:outerShdw>
+                </a:effectLst>
+              </a14:hiddenEffects>
+            </a:ext>
+          </a:extLst>
+        </p:spPr>
+      </p:pic>
+    </p:spTree>
+    <p:extLst>
+      <p:ext uri="{BB962C8B-B14F-4D97-AF65-F5344CB8AC3E}">
+        <p14:creationId xmlns:p14="http://schemas.microsoft.com/office/powerpoint/2010/main" val="1171904434"/>
+      </p:ext>
+    </p:extLst>
+  </p:cSld>
+  <p:clrMapOvr>
+    <a:masterClrMapping/>
+  </p:clrMapOvr>
+</p:sld>
+</file>
+
+<file path=ppt/slides/slide22.xml><?xml version="1.0" encoding="utf-8"?>
+<p:sld xmlns:a="http://schemas.openxmlformats.org/drawingml/2006/main" xmlns:r="http://schemas.openxmlformats.org/officeDocument/2006/relationships" xmlns:p="http://schemas.openxmlformats.org/presentationml/2006/main">
+  <p:cSld>
+    <p:spTree>
+      <p:nvGrpSpPr>
+        <p:cNvPr id="1" name=""/>
+        <p:cNvGrpSpPr/>
+        <p:nvPr/>
+      </p:nvGrpSpPr>
+      <p:grpSpPr>
+        <a:xfrm>
+          <a:off x="0" y="0"/>
+          <a:ext cx="0" cy="0"/>
+          <a:chOff x="0" y="0"/>
+          <a:chExt cx="0" cy="0"/>
+        </a:xfrm>
+      </p:grpSpPr>
+      <p:sp>
+        <p:nvSpPr>
+          <p:cNvPr id="2" name="Title 1"/>
+          <p:cNvSpPr>
+            <a:spLocks noGrp="1"/>
+          </p:cNvSpPr>
+          <p:nvPr>
+            <p:ph type="title"/>
+          </p:nvPr>
+        </p:nvSpPr>
+        <p:spPr/>
+        <p:txBody>
+          <a:bodyPr/>
+          <a:lstStyle/>
+          <a:p>
+            <a:r>
+              <a:rPr lang="en-US" dirty="0" smtClean="0"/>
+              <a:t>Schematic Diagram</a:t>
+            </a:r>
+            <a:endParaRPr lang="en-US" dirty="0"/>
+          </a:p>
+        </p:txBody>
+      </p:sp>
+      <p:pic>
+        <p:nvPicPr>
+          <p:cNvPr id="1026" name="Picture 2" descr="C:\Users\HP\Documents\Smart-Band-ESP32-S3R8\Documents\ESP32-S3-Touch-LCD-1.69_V2.1-merged.jpg"/>
+          <p:cNvPicPr>
+            <a:picLocks noChangeAspect="1" noChangeArrowheads="1"/>
+          </p:cNvPicPr>
+          <p:nvPr/>
+        </p:nvPicPr>
+        <p:blipFill>
+          <a:blip r:embed="rId2" cstate="print">
+            <a:extLst>
+              <a:ext uri="{28A0092B-C50C-407E-A947-70E740481C1C}">
+                <a14:useLocalDpi xmlns:a14="http://schemas.microsoft.com/office/drawing/2010/main" val="0"/>
+              </a:ext>
+            </a:extLst>
+          </a:blip>
+          <a:srcRect/>
+          <a:stretch>
+            <a:fillRect/>
+          </a:stretch>
+        </p:blipFill>
+        <p:spPr bwMode="auto">
+          <a:xfrm>
+            <a:off x="1066800" y="1499754"/>
+            <a:ext cx="6934200" cy="5358246"/>
+          </a:xfrm>
+          <a:prstGeom prst="rect">
+            <a:avLst/>
+          </a:prstGeom>
+          <a:noFill/>
+          <a:extLst>
+            <a:ext uri="{909E8E84-426E-40DD-AFC4-6F175D3DCCD1}">
+              <a14:hiddenFill xmlns:a14="http://schemas.microsoft.com/office/drawing/2010/main">
+                <a:solidFill>
+                  <a:srgbClr val="FFFFFF"/>
+                </a:solidFill>
+              </a14:hiddenFill>
+            </a:ext>
+          </a:extLst>
+        </p:spPr>
+      </p:pic>
+    </p:spTree>
+    <p:extLst>
+      <p:ext uri="{BB962C8B-B14F-4D97-AF65-F5344CB8AC3E}">
+        <p14:creationId xmlns:p14="http://schemas.microsoft.com/office/powerpoint/2010/main" val="2739411825"/>
+      </p:ext>
+    </p:extLst>
+  </p:cSld>
+  <p:clrMapOvr>
+    <a:masterClrMapping/>
+  </p:clrMapOvr>
+</p:sld>
+</file>
+
 <file path=ppt/slides/slide3.xml><?xml version="1.0" encoding="utf-8"?>
 <p:sld xmlns:a="http://schemas.openxmlformats.org/drawingml/2006/main" xmlns:r="http://schemas.openxmlformats.org/officeDocument/2006/relationships" xmlns:p="http://schemas.openxmlformats.org/presentationml/2006/main">
   <p:cSld>
@@ -4194,7 +4854,6 @@
               <a:rPr lang="en-US" dirty="0"/>
               <a:t>chip</a:t>
             </a:r>
-            <a:endParaRPr lang="en-US" dirty="0"/>
           </a:p>
         </p:txBody>
       </p:sp>
@@ -4453,7 +5112,6 @@
               <a:rPr lang="en-US" dirty="0"/>
               <a:t>Bluetooth DX 5.0</a:t>
             </a:r>
-            <a:endParaRPr lang="en-US" dirty="0"/>
           </a:p>
         </p:txBody>
       </p:sp>
@@ -4586,7 +5244,6 @@
               <a:rPr lang="en-US" dirty="0"/>
               <a:t> </a:t>
             </a:r>
-            <a:endParaRPr lang="en-US" dirty="0"/>
           </a:p>
         </p:txBody>
       </p:sp>
@@ -4767,7 +5424,6 @@
               <a:rPr lang="en-US" dirty="0"/>
               <a:t>QMI8658</a:t>
             </a:r>
-            <a:endParaRPr lang="en-US" dirty="0"/>
           </a:p>
         </p:txBody>
       </p:sp>
@@ -4948,7 +5604,6 @@
               <a:rPr lang="en-US" dirty="0"/>
               <a:t>ST7789v2</a:t>
             </a:r>
-            <a:endParaRPr lang="en-US" dirty="0"/>
           </a:p>
         </p:txBody>
       </p:sp>
@@ -5129,7 +5784,6 @@
               <a:rPr lang="en-US" dirty="0"/>
               <a:t>2.4 GHz Wi-Fi</a:t>
             </a:r>
-            <a:endParaRPr lang="en-US" dirty="0"/>
           </a:p>
         </p:txBody>
       </p:sp>

</xml_diff>

<commit_message>
custom partition table; add icons for ui
</commit_message>
<xml_diff>
--- a/Documents/Presentation.pptx
+++ b/Documents/Presentation.pptx
@@ -26,7 +26,9 @@
     <p:sldId id="273" r:id="rId20"/>
     <p:sldId id="274" r:id="rId21"/>
     <p:sldId id="275" r:id="rId22"/>
-    <p:sldId id="277" r:id="rId23"/>
+    <p:sldId id="278" r:id="rId23"/>
+    <p:sldId id="277" r:id="rId24"/>
+    <p:sldId id="279" r:id="rId25"/>
   </p:sldIdLst>
   <p:sldSz cx="9144000" cy="6858000" type="screen4x3"/>
   <p:notesSz cx="6858000" cy="9144000"/>
@@ -310,7 +312,7 @@
             <a:fld id="{1D8BD707-D9CF-40AE-B4C6-C98DA3205C09}" type="datetimeFigureOut">
               <a:rPr lang="en-US" smtClean="0"/>
               <a:pPr/>
-              <a:t>9/10/2025</a:t>
+              <a:t>9/11/2025</a:t>
             </a:fld>
             <a:endParaRPr lang="en-US"/>
           </a:p>
@@ -477,7 +479,7 @@
             <a:fld id="{1D8BD707-D9CF-40AE-B4C6-C98DA3205C09}" type="datetimeFigureOut">
               <a:rPr lang="en-US" smtClean="0"/>
               <a:pPr/>
-              <a:t>9/10/2025</a:t>
+              <a:t>9/11/2025</a:t>
             </a:fld>
             <a:endParaRPr lang="en-US"/>
           </a:p>
@@ -654,7 +656,7 @@
             <a:fld id="{1D8BD707-D9CF-40AE-B4C6-C98DA3205C09}" type="datetimeFigureOut">
               <a:rPr lang="en-US" smtClean="0"/>
               <a:pPr/>
-              <a:t>9/10/2025</a:t>
+              <a:t>9/11/2025</a:t>
             </a:fld>
             <a:endParaRPr lang="en-US"/>
           </a:p>
@@ -821,7 +823,7 @@
             <a:fld id="{1D8BD707-D9CF-40AE-B4C6-C98DA3205C09}" type="datetimeFigureOut">
               <a:rPr lang="en-US" smtClean="0"/>
               <a:pPr/>
-              <a:t>9/10/2025</a:t>
+              <a:t>9/11/2025</a:t>
             </a:fld>
             <a:endParaRPr lang="en-US"/>
           </a:p>
@@ -1064,7 +1066,7 @@
             <a:fld id="{1D8BD707-D9CF-40AE-B4C6-C98DA3205C09}" type="datetimeFigureOut">
               <a:rPr lang="en-US" smtClean="0"/>
               <a:pPr/>
-              <a:t>9/10/2025</a:t>
+              <a:t>9/11/2025</a:t>
             </a:fld>
             <a:endParaRPr lang="en-US"/>
           </a:p>
@@ -1349,7 +1351,7 @@
             <a:fld id="{1D8BD707-D9CF-40AE-B4C6-C98DA3205C09}" type="datetimeFigureOut">
               <a:rPr lang="en-US" smtClean="0"/>
               <a:pPr/>
-              <a:t>9/10/2025</a:t>
+              <a:t>9/11/2025</a:t>
             </a:fld>
             <a:endParaRPr lang="en-US"/>
           </a:p>
@@ -1768,7 +1770,7 @@
             <a:fld id="{1D8BD707-D9CF-40AE-B4C6-C98DA3205C09}" type="datetimeFigureOut">
               <a:rPr lang="en-US" smtClean="0"/>
               <a:pPr/>
-              <a:t>9/10/2025</a:t>
+              <a:t>9/11/2025</a:t>
             </a:fld>
             <a:endParaRPr lang="en-US"/>
           </a:p>
@@ -1883,7 +1885,7 @@
             <a:fld id="{1D8BD707-D9CF-40AE-B4C6-C98DA3205C09}" type="datetimeFigureOut">
               <a:rPr lang="en-US" smtClean="0"/>
               <a:pPr/>
-              <a:t>9/10/2025</a:t>
+              <a:t>9/11/2025</a:t>
             </a:fld>
             <a:endParaRPr lang="en-US"/>
           </a:p>
@@ -1975,7 +1977,7 @@
             <a:fld id="{1D8BD707-D9CF-40AE-B4C6-C98DA3205C09}" type="datetimeFigureOut">
               <a:rPr lang="en-US" smtClean="0"/>
               <a:pPr/>
-              <a:t>9/10/2025</a:t>
+              <a:t>9/11/2025</a:t>
             </a:fld>
             <a:endParaRPr lang="en-US"/>
           </a:p>
@@ -2249,7 +2251,7 @@
             <a:fld id="{1D8BD707-D9CF-40AE-B4C6-C98DA3205C09}" type="datetimeFigureOut">
               <a:rPr lang="en-US" smtClean="0"/>
               <a:pPr/>
-              <a:t>9/10/2025</a:t>
+              <a:t>9/11/2025</a:t>
             </a:fld>
             <a:endParaRPr lang="en-US"/>
           </a:p>
@@ -2499,7 +2501,7 @@
             <a:fld id="{1D8BD707-D9CF-40AE-B4C6-C98DA3205C09}" type="datetimeFigureOut">
               <a:rPr lang="en-US" smtClean="0"/>
               <a:pPr/>
-              <a:t>9/10/2025</a:t>
+              <a:t>9/11/2025</a:t>
             </a:fld>
             <a:endParaRPr lang="en-US"/>
           </a:p>
@@ -2709,7 +2711,7 @@
             <a:fld id="{1D8BD707-D9CF-40AE-B4C6-C98DA3205C09}" type="datetimeFigureOut">
               <a:rPr lang="en-US" smtClean="0"/>
               <a:pPr/>
-              <a:t>9/10/2025</a:t>
+              <a:t>9/11/2025</a:t>
             </a:fld>
             <a:endParaRPr lang="en-US"/>
           </a:p>
@@ -4696,6 +4698,132 @@
           <a:p>
             <a:r>
               <a:rPr lang="en-US" dirty="0" smtClean="0"/>
+              <a:t>Android Studio</a:t>
+            </a:r>
+            <a:endParaRPr lang="en-US" dirty="0"/>
+          </a:p>
+        </p:txBody>
+      </p:sp>
+      <p:pic>
+        <p:nvPicPr>
+          <p:cNvPr id="1027" name="Picture 3"/>
+          <p:cNvPicPr>
+            <a:picLocks noGrp="1" noChangeAspect="1" noChangeArrowheads="1"/>
+          </p:cNvPicPr>
+          <p:nvPr>
+            <p:ph idx="1"/>
+          </p:nvPr>
+        </p:nvPicPr>
+        <p:blipFill>
+          <a:blip r:embed="rId2" cstate="print">
+            <a:extLst>
+              <a:ext uri="{28A0092B-C50C-407E-A947-70E740481C1C}">
+                <a14:useLocalDpi xmlns:a14="http://schemas.microsoft.com/office/drawing/2010/main" val="0"/>
+              </a:ext>
+            </a:extLst>
+          </a:blip>
+          <a:srcRect/>
+          <a:stretch>
+            <a:fillRect/>
+          </a:stretch>
+        </p:blipFill>
+        <p:spPr bwMode="auto">
+          <a:xfrm>
+            <a:off x="457200" y="1662616"/>
+            <a:ext cx="8229600" cy="4401130"/>
+          </a:xfrm>
+          <a:prstGeom prst="rect">
+            <a:avLst/>
+          </a:prstGeom>
+          <a:noFill/>
+          <a:ln>
+            <a:noFill/>
+          </a:ln>
+          <a:effectLst/>
+          <a:extLst>
+            <a:ext uri="{909E8E84-426E-40DD-AFC4-6F175D3DCCD1}">
+              <a14:hiddenFill xmlns:a14="http://schemas.microsoft.com/office/drawing/2010/main">
+                <a:solidFill>
+                  <a:schemeClr val="accent1"/>
+                </a:solidFill>
+              </a14:hiddenFill>
+            </a:ext>
+            <a:ext uri="{91240B29-F687-4F45-9708-019B960494DF}">
+              <a14:hiddenLine xmlns:a14="http://schemas.microsoft.com/office/drawing/2010/main" w="9525">
+                <a:solidFill>
+                  <a:schemeClr val="tx1"/>
+                </a:solidFill>
+                <a:miter lim="800000"/>
+                <a:headEnd/>
+                <a:tailEnd/>
+              </a14:hiddenLine>
+            </a:ext>
+            <a:ext uri="{AF507438-7753-43E0-B8FC-AC1667EBCBE1}">
+              <a14:hiddenEffects xmlns:a14="http://schemas.microsoft.com/office/drawing/2010/main">
+                <a:effectLst>
+                  <a:outerShdw dist="35921" dir="2700000" algn="ctr" rotWithShape="0">
+                    <a:schemeClr val="bg2"/>
+                  </a:outerShdw>
+                </a:effectLst>
+              </a14:hiddenEffects>
+            </a:ext>
+          </a:extLst>
+        </p:spPr>
+      </p:pic>
+    </p:spTree>
+    <p:extLst>
+      <p:ext uri="{BB962C8B-B14F-4D97-AF65-F5344CB8AC3E}">
+        <p14:creationId xmlns:p14="http://schemas.microsoft.com/office/powerpoint/2010/main" val="470184994"/>
+      </p:ext>
+    </p:extLst>
+  </p:cSld>
+  <p:clrMapOvr>
+    <a:masterClrMapping/>
+  </p:clrMapOvr>
+  <p:timing>
+    <p:tnLst>
+      <p:par>
+        <p:cTn id="1" dur="indefinite" restart="never" nodeType="tmRoot"/>
+      </p:par>
+    </p:tnLst>
+  </p:timing>
+</p:sld>
+</file>
+
+<file path=ppt/slides/slide23.xml><?xml version="1.0" encoding="utf-8"?>
+<p:sld xmlns:a="http://schemas.openxmlformats.org/drawingml/2006/main" xmlns:r="http://schemas.openxmlformats.org/officeDocument/2006/relationships" xmlns:p="http://schemas.openxmlformats.org/presentationml/2006/main">
+  <p:cSld>
+    <p:spTree>
+      <p:nvGrpSpPr>
+        <p:cNvPr id="1" name=""/>
+        <p:cNvGrpSpPr/>
+        <p:nvPr/>
+      </p:nvGrpSpPr>
+      <p:grpSpPr>
+        <a:xfrm>
+          <a:off x="0" y="0"/>
+          <a:ext cx="0" cy="0"/>
+          <a:chOff x="0" y="0"/>
+          <a:chExt cx="0" cy="0"/>
+        </a:xfrm>
+      </p:grpSpPr>
+      <p:sp>
+        <p:nvSpPr>
+          <p:cNvPr id="2" name="Title 1"/>
+          <p:cNvSpPr>
+            <a:spLocks noGrp="1"/>
+          </p:cNvSpPr>
+          <p:nvPr>
+            <p:ph type="title"/>
+          </p:nvPr>
+        </p:nvSpPr>
+        <p:spPr/>
+        <p:txBody>
+          <a:bodyPr/>
+          <a:lstStyle/>
+          <a:p>
+            <a:r>
+              <a:rPr lang="en-US" dirty="0" smtClean="0"/>
               <a:t>Schematic Diagram</a:t>
             </a:r>
             <a:endParaRPr lang="en-US" dirty="0"/>
@@ -4725,7 +4853,7 @@
         </p:blipFill>
         <p:spPr bwMode="auto">
           <a:xfrm>
-            <a:off x="1066800" y="1499754"/>
+            <a:off x="1066800" y="1271154"/>
             <a:ext cx="6934200" cy="5358246"/>
           </a:xfrm>
           <a:prstGeom prst="rect">
@@ -4747,6 +4875,132 @@
     <p:extLst>
       <p:ext uri="{BB962C8B-B14F-4D97-AF65-F5344CB8AC3E}">
         <p14:creationId xmlns:p14="http://schemas.microsoft.com/office/powerpoint/2010/main" val="2739411825"/>
+      </p:ext>
+    </p:extLst>
+  </p:cSld>
+  <p:clrMapOvr>
+    <a:masterClrMapping/>
+  </p:clrMapOvr>
+  <p:timing>
+    <p:tnLst>
+      <p:par>
+        <p:cTn id="1" dur="indefinite" restart="never" nodeType="tmRoot"/>
+      </p:par>
+    </p:tnLst>
+  </p:timing>
+</p:sld>
+</file>
+
+<file path=ppt/slides/slide24.xml><?xml version="1.0" encoding="utf-8"?>
+<p:sld xmlns:a="http://schemas.openxmlformats.org/drawingml/2006/main" xmlns:r="http://schemas.openxmlformats.org/officeDocument/2006/relationships" xmlns:p="http://schemas.openxmlformats.org/presentationml/2006/main">
+  <p:cSld>
+    <p:spTree>
+      <p:nvGrpSpPr>
+        <p:cNvPr id="1" name=""/>
+        <p:cNvGrpSpPr/>
+        <p:nvPr/>
+      </p:nvGrpSpPr>
+      <p:grpSpPr>
+        <a:xfrm>
+          <a:off x="0" y="0"/>
+          <a:ext cx="0" cy="0"/>
+          <a:chOff x="0" y="0"/>
+          <a:chExt cx="0" cy="0"/>
+        </a:xfrm>
+      </p:grpSpPr>
+      <p:sp>
+        <p:nvSpPr>
+          <p:cNvPr id="2" name="Title 1"/>
+          <p:cNvSpPr>
+            <a:spLocks noGrp="1"/>
+          </p:cNvSpPr>
+          <p:nvPr>
+            <p:ph type="title"/>
+          </p:nvPr>
+        </p:nvSpPr>
+        <p:spPr/>
+        <p:txBody>
+          <a:bodyPr/>
+          <a:lstStyle/>
+          <a:p>
+            <a:r>
+              <a:rPr lang="en-US" dirty="0" smtClean="0"/>
+              <a:t>UI Schematic</a:t>
+            </a:r>
+            <a:endParaRPr lang="en-US" dirty="0"/>
+          </a:p>
+        </p:txBody>
+      </p:sp>
+      <p:pic>
+        <p:nvPicPr>
+          <p:cNvPr id="2050" name="Picture 2"/>
+          <p:cNvPicPr>
+            <a:picLocks noGrp="1" noChangeAspect="1" noChangeArrowheads="1"/>
+          </p:cNvPicPr>
+          <p:nvPr>
+            <p:ph idx="1"/>
+          </p:nvPr>
+        </p:nvPicPr>
+        <p:blipFill>
+          <a:blip r:embed="rId2">
+            <a:extLst>
+              <a:ext uri="{28A0092B-C50C-407E-A947-70E740481C1C}">
+                <a14:useLocalDpi xmlns:a14="http://schemas.microsoft.com/office/drawing/2010/main" val="0"/>
+              </a:ext>
+            </a:extLst>
+          </a:blip>
+          <a:srcRect/>
+          <a:stretch>
+            <a:fillRect/>
+          </a:stretch>
+        </p:blipFill>
+        <p:spPr bwMode="auto">
+          <a:xfrm>
+            <a:off x="1361910" y="1808851"/>
+            <a:ext cx="6420180" cy="4108661"/>
+          </a:xfrm>
+          <a:prstGeom prst="rect">
+            <a:avLst/>
+          </a:prstGeom>
+          <a:noFill/>
+          <a:ln>
+            <a:noFill/>
+          </a:ln>
+          <a:effectLst/>
+          <a:extLst>
+            <a:ext uri="{909E8E84-426E-40DD-AFC4-6F175D3DCCD1}">
+              <a14:hiddenFill xmlns:a14="http://schemas.microsoft.com/office/drawing/2010/main">
+                <a:solidFill>
+                  <a:schemeClr val="accent1"/>
+                </a:solidFill>
+              </a14:hiddenFill>
+            </a:ext>
+            <a:ext uri="{91240B29-F687-4F45-9708-019B960494DF}">
+              <a14:hiddenLine xmlns:a14="http://schemas.microsoft.com/office/drawing/2010/main" w="9525">
+                <a:solidFill>
+                  <a:schemeClr val="tx1"/>
+                </a:solidFill>
+                <a:miter lim="800000"/>
+                <a:headEnd/>
+                <a:tailEnd/>
+              </a14:hiddenLine>
+            </a:ext>
+            <a:ext uri="{AF507438-7753-43E0-B8FC-AC1667EBCBE1}">
+              <a14:hiddenEffects xmlns:a14="http://schemas.microsoft.com/office/drawing/2010/main">
+                <a:effectLst>
+                  <a:outerShdw dist="35921" dir="2700000" algn="ctr" rotWithShape="0">
+                    <a:schemeClr val="bg2"/>
+                  </a:outerShdw>
+                </a:effectLst>
+              </a14:hiddenEffects>
+            </a:ext>
+          </a:extLst>
+        </p:spPr>
+      </p:pic>
+    </p:spTree>
+    <p:extLst>
+      <p:ext uri="{BB962C8B-B14F-4D97-AF65-F5344CB8AC3E}">
+        <p14:creationId xmlns:p14="http://schemas.microsoft.com/office/powerpoint/2010/main" val="1817949353"/>
       </p:ext>
     </p:extLst>
   </p:cSld>

</xml_diff>